<commit_message>
Added first draft of Condition HW Key
</commit_message>
<xml_diff>
--- a/modules/MgmntBagLimits/READING_Rypel_2015.pptx
+++ b/modules/MgmntBagLimits/READING_Rypel_2015.pptx
@@ -266,7 +266,7 @@
           <a:p>
             <a:fld id="{07A46C8F-DB9C-4B91-A1F1-A860256637FA}" type="datetimeFigureOut">
               <a:rPr lang="en-US" smtClean="0"/>
-              <a:t>4/3/2017</a:t>
+              <a:t>3/21/2018</a:t>
             </a:fld>
             <a:endParaRPr lang="en-US"/>
           </a:p>
@@ -436,7 +436,7 @@
           <a:p>
             <a:fld id="{07A46C8F-DB9C-4B91-A1F1-A860256637FA}" type="datetimeFigureOut">
               <a:rPr lang="en-US" smtClean="0"/>
-              <a:t>4/3/2017</a:t>
+              <a:t>3/21/2018</a:t>
             </a:fld>
             <a:endParaRPr lang="en-US"/>
           </a:p>
@@ -616,7 +616,7 @@
           <a:p>
             <a:fld id="{07A46C8F-DB9C-4B91-A1F1-A860256637FA}" type="datetimeFigureOut">
               <a:rPr lang="en-US" smtClean="0"/>
-              <a:t>4/3/2017</a:t>
+              <a:t>3/21/2018</a:t>
             </a:fld>
             <a:endParaRPr lang="en-US"/>
           </a:p>
@@ -786,7 +786,7 @@
           <a:p>
             <a:fld id="{07A46C8F-DB9C-4B91-A1F1-A860256637FA}" type="datetimeFigureOut">
               <a:rPr lang="en-US" smtClean="0"/>
-              <a:t>4/3/2017</a:t>
+              <a:t>3/21/2018</a:t>
             </a:fld>
             <a:endParaRPr lang="en-US"/>
           </a:p>
@@ -1030,7 +1030,7 @@
           <a:p>
             <a:fld id="{07A46C8F-DB9C-4B91-A1F1-A860256637FA}" type="datetimeFigureOut">
               <a:rPr lang="en-US" smtClean="0"/>
-              <a:t>4/3/2017</a:t>
+              <a:t>3/21/2018</a:t>
             </a:fld>
             <a:endParaRPr lang="en-US"/>
           </a:p>
@@ -1262,7 +1262,7 @@
           <a:p>
             <a:fld id="{07A46C8F-DB9C-4B91-A1F1-A860256637FA}" type="datetimeFigureOut">
               <a:rPr lang="en-US" smtClean="0"/>
-              <a:t>4/3/2017</a:t>
+              <a:t>3/21/2018</a:t>
             </a:fld>
             <a:endParaRPr lang="en-US"/>
           </a:p>
@@ -1629,7 +1629,7 @@
           <a:p>
             <a:fld id="{07A46C8F-DB9C-4B91-A1F1-A860256637FA}" type="datetimeFigureOut">
               <a:rPr lang="en-US" smtClean="0"/>
-              <a:t>4/3/2017</a:t>
+              <a:t>3/21/2018</a:t>
             </a:fld>
             <a:endParaRPr lang="en-US"/>
           </a:p>
@@ -1747,7 +1747,7 @@
           <a:p>
             <a:fld id="{07A46C8F-DB9C-4B91-A1F1-A860256637FA}" type="datetimeFigureOut">
               <a:rPr lang="en-US" smtClean="0"/>
-              <a:t>4/3/2017</a:t>
+              <a:t>3/21/2018</a:t>
             </a:fld>
             <a:endParaRPr lang="en-US"/>
           </a:p>
@@ -1842,7 +1842,7 @@
           <a:p>
             <a:fld id="{07A46C8F-DB9C-4B91-A1F1-A860256637FA}" type="datetimeFigureOut">
               <a:rPr lang="en-US" smtClean="0"/>
-              <a:t>4/3/2017</a:t>
+              <a:t>3/21/2018</a:t>
             </a:fld>
             <a:endParaRPr lang="en-US"/>
           </a:p>
@@ -2119,7 +2119,7 @@
           <a:p>
             <a:fld id="{07A46C8F-DB9C-4B91-A1F1-A860256637FA}" type="datetimeFigureOut">
               <a:rPr lang="en-US" smtClean="0"/>
-              <a:t>4/3/2017</a:t>
+              <a:t>3/21/2018</a:t>
             </a:fld>
             <a:endParaRPr lang="en-US"/>
           </a:p>
@@ -2376,7 +2376,7 @@
           <a:p>
             <a:fld id="{07A46C8F-DB9C-4B91-A1F1-A860256637FA}" type="datetimeFigureOut">
               <a:rPr lang="en-US" smtClean="0"/>
-              <a:t>4/3/2017</a:t>
+              <a:t>3/21/2018</a:t>
             </a:fld>
             <a:endParaRPr lang="en-US"/>
           </a:p>
@@ -2589,7 +2589,7 @@
           <a:p>
             <a:fld id="{07A46C8F-DB9C-4B91-A1F1-A860256637FA}" type="datetimeFigureOut">
               <a:rPr lang="en-US" smtClean="0"/>
-              <a:t>4/3/2017</a:t>
+              <a:t>3/21/2018</a:t>
             </a:fld>
             <a:endParaRPr lang="en-US"/>
           </a:p>
@@ -4353,6 +4353,111 @@
           </a:p>
         </p:txBody>
       </p:sp>
+      <p:cxnSp>
+        <p:nvCxnSpPr>
+          <p:cNvPr id="8" name="Straight Connector 7"/>
+          <p:cNvCxnSpPr/>
+          <p:nvPr/>
+        </p:nvCxnSpPr>
+        <p:spPr>
+          <a:xfrm>
+            <a:off x="5418052" y="1964602"/>
+            <a:ext cx="1448740" cy="0"/>
+          </a:xfrm>
+          <a:prstGeom prst="line">
+            <a:avLst/>
+          </a:prstGeom>
+          <a:ln w="25400">
+            <a:solidFill>
+              <a:srgbClr val="FF0000"/>
+            </a:solidFill>
+          </a:ln>
+        </p:spPr>
+        <p:style>
+          <a:lnRef idx="1">
+            <a:schemeClr val="accent1"/>
+          </a:lnRef>
+          <a:fillRef idx="0">
+            <a:schemeClr val="accent1"/>
+          </a:fillRef>
+          <a:effectRef idx="0">
+            <a:schemeClr val="accent1"/>
+          </a:effectRef>
+          <a:fontRef idx="minor">
+            <a:schemeClr val="tx1"/>
+          </a:fontRef>
+        </p:style>
+      </p:cxnSp>
+      <p:cxnSp>
+        <p:nvCxnSpPr>
+          <p:cNvPr id="9" name="Straight Connector 8"/>
+          <p:cNvCxnSpPr/>
+          <p:nvPr/>
+        </p:nvCxnSpPr>
+        <p:spPr>
+          <a:xfrm flipV="1">
+            <a:off x="733424" y="2268415"/>
+            <a:ext cx="6133368" cy="15641"/>
+          </a:xfrm>
+          <a:prstGeom prst="line">
+            <a:avLst/>
+          </a:prstGeom>
+          <a:ln w="25400">
+            <a:solidFill>
+              <a:srgbClr val="FF0000"/>
+            </a:solidFill>
+          </a:ln>
+        </p:spPr>
+        <p:style>
+          <a:lnRef idx="1">
+            <a:schemeClr val="accent1"/>
+          </a:lnRef>
+          <a:fillRef idx="0">
+            <a:schemeClr val="accent1"/>
+          </a:fillRef>
+          <a:effectRef idx="0">
+            <a:schemeClr val="accent1"/>
+          </a:effectRef>
+          <a:fontRef idx="minor">
+            <a:schemeClr val="tx1"/>
+          </a:fontRef>
+        </p:style>
+      </p:cxnSp>
+      <p:cxnSp>
+        <p:nvCxnSpPr>
+          <p:cNvPr id="10" name="Straight Connector 9"/>
+          <p:cNvCxnSpPr/>
+          <p:nvPr/>
+        </p:nvCxnSpPr>
+        <p:spPr>
+          <a:xfrm flipV="1">
+            <a:off x="733424" y="2532185"/>
+            <a:ext cx="4684628" cy="9779"/>
+          </a:xfrm>
+          <a:prstGeom prst="line">
+            <a:avLst/>
+          </a:prstGeom>
+          <a:ln w="25400">
+            <a:solidFill>
+              <a:srgbClr val="FF0000"/>
+            </a:solidFill>
+          </a:ln>
+        </p:spPr>
+        <p:style>
+          <a:lnRef idx="1">
+            <a:schemeClr val="accent1"/>
+          </a:lnRef>
+          <a:fillRef idx="0">
+            <a:schemeClr val="accent1"/>
+          </a:fillRef>
+          <a:effectRef idx="0">
+            <a:schemeClr val="accent1"/>
+          </a:effectRef>
+          <a:fontRef idx="minor">
+            <a:schemeClr val="tx1"/>
+          </a:fontRef>
+        </p:style>
+      </p:cxnSp>
     </p:spTree>
     <p:extLst>
       <p:ext uri="{BB962C8B-B14F-4D97-AF65-F5344CB8AC3E}">
@@ -4398,6 +4503,87 @@
                                         </p:cTn>
                                         <p:tgtEl>
                                           <p:spTgt spid="5"/>
+                                        </p:tgtEl>
+                                        <p:attrNameLst>
+                                          <p:attrName>style.visibility</p:attrName>
+                                        </p:attrNameLst>
+                                      </p:cBhvr>
+                                      <p:to>
+                                        <p:strVal val="visible"/>
+                                      </p:to>
+                                    </p:set>
+                                  </p:childTnLst>
+                                </p:cTn>
+                              </p:par>
+                              <p:par>
+                                <p:cTn id="7" presetID="1" presetClass="entr" presetSubtype="0" fill="hold" nodeType="withEffect">
+                                  <p:stCondLst>
+                                    <p:cond delay="0"/>
+                                  </p:stCondLst>
+                                  <p:childTnLst>
+                                    <p:set>
+                                      <p:cBhvr>
+                                        <p:cTn id="8" dur="1" fill="hold">
+                                          <p:stCondLst>
+                                            <p:cond delay="0"/>
+                                          </p:stCondLst>
+                                        </p:cTn>
+                                        <p:tgtEl>
+                                          <p:spTgt spid="8"/>
+                                        </p:tgtEl>
+                                        <p:attrNameLst>
+                                          <p:attrName>style.visibility</p:attrName>
+                                        </p:attrNameLst>
+                                      </p:cBhvr>
+                                      <p:to>
+                                        <p:strVal val="visible"/>
+                                      </p:to>
+                                    </p:set>
+                                  </p:childTnLst>
+                                </p:cTn>
+                              </p:par>
+                              <p:par>
+                                <p:cTn id="9" presetID="1" presetClass="entr" presetSubtype="0" fill="hold" nodeType="withEffect">
+                                  <p:stCondLst>
+                                    <p:cond delay="0"/>
+                                  </p:stCondLst>
+                                  <p:childTnLst>
+                                    <p:set>
+                                      <p:cBhvr>
+                                        <p:cTn id="10" dur="1" fill="hold">
+                                          <p:stCondLst>
+                                            <p:cond delay="0"/>
+                                          </p:stCondLst>
+                                        </p:cTn>
+                                        <p:tgtEl>
+                                          <p:spTgt spid="9"/>
+                                        </p:tgtEl>
+                                        <p:attrNameLst>
+                                          <p:attrName>style.visibility</p:attrName>
+                                        </p:attrNameLst>
+                                      </p:cBhvr>
+                                      <p:to>
+                                        <p:strVal val="visible"/>
+                                      </p:to>
+                                    </p:set>
+                                  </p:childTnLst>
+                                </p:cTn>
+                              </p:par>
+                              <p:par>
+                                <p:cTn id="11" presetID="1" presetClass="entr" presetSubtype="0" fill="hold" nodeType="withEffect">
+                                  <p:stCondLst>
+                                    <p:cond delay="0"/>
+                                  </p:stCondLst>
+                                  <p:childTnLst>
+                                    <p:set>
+                                      <p:cBhvr>
+                                        <p:cTn id="12" dur="1" fill="hold">
+                                          <p:stCondLst>
+                                            <p:cond delay="0"/>
+                                          </p:stCondLst>
+                                        </p:cTn>
+                                        <p:tgtEl>
+                                          <p:spTgt spid="10"/>
                                         </p:tgtEl>
                                         <p:attrNameLst>
                                           <p:attrName>style.visibility</p:attrName>
@@ -5376,6 +5562,113 @@
           </a:prstGeom>
         </p:spPr>
       </p:pic>
+      <p:grpSp>
+        <p:nvGrpSpPr>
+          <p:cNvPr id="6" name="Group 5"/>
+          <p:cNvGrpSpPr/>
+          <p:nvPr/>
+        </p:nvGrpSpPr>
+        <p:grpSpPr>
+          <a:xfrm>
+            <a:off x="2145323" y="0"/>
+            <a:ext cx="6998677" cy="6392008"/>
+            <a:chOff x="2145323" y="0"/>
+            <a:chExt cx="6998677" cy="6392008"/>
+          </a:xfrm>
+        </p:grpSpPr>
+        <p:sp>
+          <p:nvSpPr>
+            <p:cNvPr id="4" name="Rectangle 3"/>
+            <p:cNvSpPr/>
+            <p:nvPr/>
+          </p:nvSpPr>
+          <p:spPr>
+            <a:xfrm>
+              <a:off x="2145323" y="1846385"/>
+              <a:ext cx="6998677" cy="4545623"/>
+            </a:xfrm>
+            <a:prstGeom prst="rect">
+              <a:avLst/>
+            </a:prstGeom>
+            <a:solidFill>
+              <a:schemeClr val="bg1"/>
+            </a:solidFill>
+            <a:ln>
+              <a:noFill/>
+            </a:ln>
+          </p:spPr>
+          <p:style>
+            <a:lnRef idx="2">
+              <a:schemeClr val="accent1">
+                <a:shade val="50000"/>
+              </a:schemeClr>
+            </a:lnRef>
+            <a:fillRef idx="1">
+              <a:schemeClr val="accent1"/>
+            </a:fillRef>
+            <a:effectRef idx="0">
+              <a:schemeClr val="accent1"/>
+            </a:effectRef>
+            <a:fontRef idx="minor">
+              <a:schemeClr val="lt1"/>
+            </a:fontRef>
+          </p:style>
+          <p:txBody>
+            <a:bodyPr rtlCol="0" anchor="ctr"/>
+            <a:lstStyle/>
+            <a:p>
+              <a:pPr algn="ctr"/>
+              <a:endParaRPr lang="en-US"/>
+            </a:p>
+          </p:txBody>
+        </p:sp>
+        <p:sp>
+          <p:nvSpPr>
+            <p:cNvPr id="5" name="Rectangle 4"/>
+            <p:cNvSpPr/>
+            <p:nvPr/>
+          </p:nvSpPr>
+          <p:spPr>
+            <a:xfrm>
+              <a:off x="5767754" y="0"/>
+              <a:ext cx="3376245" cy="1846385"/>
+            </a:xfrm>
+            <a:prstGeom prst="rect">
+              <a:avLst/>
+            </a:prstGeom>
+            <a:solidFill>
+              <a:schemeClr val="bg1"/>
+            </a:solidFill>
+            <a:ln>
+              <a:noFill/>
+            </a:ln>
+          </p:spPr>
+          <p:style>
+            <a:lnRef idx="2">
+              <a:schemeClr val="accent1">
+                <a:shade val="50000"/>
+              </a:schemeClr>
+            </a:lnRef>
+            <a:fillRef idx="1">
+              <a:schemeClr val="accent1"/>
+            </a:fillRef>
+            <a:effectRef idx="0">
+              <a:schemeClr val="accent1"/>
+            </a:effectRef>
+            <a:fontRef idx="minor">
+              <a:schemeClr val="lt1"/>
+            </a:fontRef>
+          </p:style>
+          <p:txBody>
+            <a:bodyPr rtlCol="0" anchor="ctr"/>
+            <a:lstStyle/>
+            <a:p>
+              <a:pPr algn="ctr"/>
+              <a:endParaRPr lang="en-US"/>
+            </a:p>
+          </p:txBody>
+        </p:sp>
+      </p:grpSp>
     </p:spTree>
     <p:extLst>
       <p:ext uri="{BB962C8B-B14F-4D97-AF65-F5344CB8AC3E}">
@@ -5389,7 +5682,75 @@
   <p:timing>
     <p:tnLst>
       <p:par>
-        <p:cTn id="1" dur="indefinite" restart="never" nodeType="tmRoot"/>
+        <p:cTn id="1" dur="indefinite" restart="never" nodeType="tmRoot">
+          <p:childTnLst>
+            <p:seq concurrent="1" nextAc="seek">
+              <p:cTn id="2" dur="indefinite" nodeType="mainSeq">
+                <p:childTnLst>
+                  <p:par>
+                    <p:cTn id="3" fill="hold">
+                      <p:stCondLst>
+                        <p:cond delay="indefinite"/>
+                      </p:stCondLst>
+                      <p:childTnLst>
+                        <p:par>
+                          <p:cTn id="4" fill="hold">
+                            <p:stCondLst>
+                              <p:cond delay="0"/>
+                            </p:stCondLst>
+                            <p:childTnLst>
+                              <p:par>
+                                <p:cTn id="5" presetID="1" presetClass="exit" presetSubtype="0" fill="hold" nodeType="clickEffect">
+                                  <p:stCondLst>
+                                    <p:cond delay="0"/>
+                                  </p:stCondLst>
+                                  <p:childTnLst>
+                                    <p:set>
+                                      <p:cBhvr>
+                                        <p:cTn id="6" dur="1" fill="hold">
+                                          <p:stCondLst>
+                                            <p:cond delay="0"/>
+                                          </p:stCondLst>
+                                        </p:cTn>
+                                        <p:tgtEl>
+                                          <p:spTgt spid="6"/>
+                                        </p:tgtEl>
+                                        <p:attrNameLst>
+                                          <p:attrName>style.visibility</p:attrName>
+                                        </p:attrNameLst>
+                                      </p:cBhvr>
+                                      <p:to>
+                                        <p:strVal val="hidden"/>
+                                      </p:to>
+                                    </p:set>
+                                  </p:childTnLst>
+                                </p:cTn>
+                              </p:par>
+                            </p:childTnLst>
+                          </p:cTn>
+                        </p:par>
+                      </p:childTnLst>
+                    </p:cTn>
+                  </p:par>
+                </p:childTnLst>
+              </p:cTn>
+              <p:prevCondLst>
+                <p:cond evt="onPrev" delay="0">
+                  <p:tgtEl>
+                    <p:sldTgt/>
+                  </p:tgtEl>
+                </p:cond>
+              </p:prevCondLst>
+              <p:nextCondLst>
+                <p:cond evt="onNext" delay="0">
+                  <p:tgtEl>
+                    <p:sldTgt/>
+                  </p:tgtEl>
+                </p:cond>
+              </p:nextCondLst>
+            </p:seq>
+          </p:childTnLst>
+        </p:cTn>
       </p:par>
     </p:tnLst>
   </p:timing>
@@ -5465,6 +5826,52 @@
           </a:prstGeom>
         </p:spPr>
       </p:pic>
+      <p:sp>
+        <p:nvSpPr>
+          <p:cNvPr id="4" name="Rectangle 3"/>
+          <p:cNvSpPr/>
+          <p:nvPr/>
+        </p:nvSpPr>
+        <p:spPr>
+          <a:xfrm>
+            <a:off x="0" y="3472777"/>
+            <a:ext cx="9030789" cy="1712068"/>
+          </a:xfrm>
+          <a:prstGeom prst="rect">
+            <a:avLst/>
+          </a:prstGeom>
+          <a:solidFill>
+            <a:schemeClr val="bg1"/>
+          </a:solidFill>
+          <a:ln>
+            <a:noFill/>
+          </a:ln>
+        </p:spPr>
+        <p:style>
+          <a:lnRef idx="2">
+            <a:schemeClr val="accent1">
+              <a:shade val="50000"/>
+            </a:schemeClr>
+          </a:lnRef>
+          <a:fillRef idx="1">
+            <a:schemeClr val="accent1"/>
+          </a:fillRef>
+          <a:effectRef idx="0">
+            <a:schemeClr val="accent1"/>
+          </a:effectRef>
+          <a:fontRef idx="minor">
+            <a:schemeClr val="lt1"/>
+          </a:fontRef>
+        </p:style>
+        <p:txBody>
+          <a:bodyPr rtlCol="0" anchor="ctr"/>
+          <a:lstStyle/>
+          <a:p>
+            <a:pPr algn="ctr"/>
+            <a:endParaRPr lang="en-US"/>
+          </a:p>
+        </p:txBody>
+      </p:sp>
     </p:spTree>
     <p:extLst>
       <p:ext uri="{BB962C8B-B14F-4D97-AF65-F5344CB8AC3E}">
@@ -5478,9 +5885,80 @@
   <p:timing>
     <p:tnLst>
       <p:par>
-        <p:cTn id="1" dur="indefinite" restart="never" nodeType="tmRoot"/>
+        <p:cTn id="1" dur="indefinite" restart="never" nodeType="tmRoot">
+          <p:childTnLst>
+            <p:seq concurrent="1" nextAc="seek">
+              <p:cTn id="2" dur="indefinite" nodeType="mainSeq">
+                <p:childTnLst>
+                  <p:par>
+                    <p:cTn id="3" fill="hold">
+                      <p:stCondLst>
+                        <p:cond delay="indefinite"/>
+                      </p:stCondLst>
+                      <p:childTnLst>
+                        <p:par>
+                          <p:cTn id="4" fill="hold">
+                            <p:stCondLst>
+                              <p:cond delay="0"/>
+                            </p:stCondLst>
+                            <p:childTnLst>
+                              <p:par>
+                                <p:cTn id="5" presetID="1" presetClass="exit" presetSubtype="0" fill="hold" grpId="0" nodeType="clickEffect">
+                                  <p:stCondLst>
+                                    <p:cond delay="0"/>
+                                  </p:stCondLst>
+                                  <p:childTnLst>
+                                    <p:set>
+                                      <p:cBhvr>
+                                        <p:cTn id="6" dur="1" fill="hold">
+                                          <p:stCondLst>
+                                            <p:cond delay="0"/>
+                                          </p:stCondLst>
+                                        </p:cTn>
+                                        <p:tgtEl>
+                                          <p:spTgt spid="4"/>
+                                        </p:tgtEl>
+                                        <p:attrNameLst>
+                                          <p:attrName>style.visibility</p:attrName>
+                                        </p:attrNameLst>
+                                      </p:cBhvr>
+                                      <p:to>
+                                        <p:strVal val="hidden"/>
+                                      </p:to>
+                                    </p:set>
+                                  </p:childTnLst>
+                                </p:cTn>
+                              </p:par>
+                            </p:childTnLst>
+                          </p:cTn>
+                        </p:par>
+                      </p:childTnLst>
+                    </p:cTn>
+                  </p:par>
+                </p:childTnLst>
+              </p:cTn>
+              <p:prevCondLst>
+                <p:cond evt="onPrev" delay="0">
+                  <p:tgtEl>
+                    <p:sldTgt/>
+                  </p:tgtEl>
+                </p:cond>
+              </p:prevCondLst>
+              <p:nextCondLst>
+                <p:cond evt="onNext" delay="0">
+                  <p:tgtEl>
+                    <p:sldTgt/>
+                  </p:tgtEl>
+                </p:cond>
+              </p:nextCondLst>
+            </p:seq>
+          </p:childTnLst>
+        </p:cTn>
       </p:par>
     </p:tnLst>
+    <p:bldLst>
+      <p:bldP spid="4" grpId="0" animBg="1"/>
+    </p:bldLst>
   </p:timing>
 </p:sld>
 </file>
@@ -5554,6 +6032,52 @@
           </a:prstGeom>
         </p:spPr>
       </p:pic>
+      <p:sp>
+        <p:nvSpPr>
+          <p:cNvPr id="5" name="Rectangle 4"/>
+          <p:cNvSpPr/>
+          <p:nvPr/>
+        </p:nvSpPr>
+        <p:spPr>
+          <a:xfrm>
+            <a:off x="3064213" y="1806046"/>
+            <a:ext cx="6023180" cy="3281519"/>
+          </a:xfrm>
+          <a:prstGeom prst="rect">
+            <a:avLst/>
+          </a:prstGeom>
+          <a:solidFill>
+            <a:schemeClr val="bg1"/>
+          </a:solidFill>
+          <a:ln>
+            <a:noFill/>
+          </a:ln>
+        </p:spPr>
+        <p:style>
+          <a:lnRef idx="2">
+            <a:schemeClr val="accent1">
+              <a:shade val="50000"/>
+            </a:schemeClr>
+          </a:lnRef>
+          <a:fillRef idx="1">
+            <a:schemeClr val="accent1"/>
+          </a:fillRef>
+          <a:effectRef idx="0">
+            <a:schemeClr val="accent1"/>
+          </a:effectRef>
+          <a:fontRef idx="minor">
+            <a:schemeClr val="lt1"/>
+          </a:fontRef>
+        </p:style>
+        <p:txBody>
+          <a:bodyPr rtlCol="0" anchor="ctr"/>
+          <a:lstStyle/>
+          <a:p>
+            <a:pPr algn="ctr"/>
+            <a:endParaRPr lang="en-US"/>
+          </a:p>
+        </p:txBody>
+      </p:sp>
     </p:spTree>
     <p:extLst>
       <p:ext uri="{BB962C8B-B14F-4D97-AF65-F5344CB8AC3E}">
@@ -5567,9 +6091,80 @@
   <p:timing>
     <p:tnLst>
       <p:par>
-        <p:cTn id="1" dur="indefinite" restart="never" nodeType="tmRoot"/>
+        <p:cTn id="1" dur="indefinite" restart="never" nodeType="tmRoot">
+          <p:childTnLst>
+            <p:seq concurrent="1" nextAc="seek">
+              <p:cTn id="2" dur="indefinite" nodeType="mainSeq">
+                <p:childTnLst>
+                  <p:par>
+                    <p:cTn id="3" fill="hold">
+                      <p:stCondLst>
+                        <p:cond delay="indefinite"/>
+                      </p:stCondLst>
+                      <p:childTnLst>
+                        <p:par>
+                          <p:cTn id="4" fill="hold">
+                            <p:stCondLst>
+                              <p:cond delay="0"/>
+                            </p:stCondLst>
+                            <p:childTnLst>
+                              <p:par>
+                                <p:cTn id="5" presetID="1" presetClass="exit" presetSubtype="0" fill="hold" grpId="0" nodeType="clickEffect">
+                                  <p:stCondLst>
+                                    <p:cond delay="0"/>
+                                  </p:stCondLst>
+                                  <p:childTnLst>
+                                    <p:set>
+                                      <p:cBhvr>
+                                        <p:cTn id="6" dur="1" fill="hold">
+                                          <p:stCondLst>
+                                            <p:cond delay="0"/>
+                                          </p:stCondLst>
+                                        </p:cTn>
+                                        <p:tgtEl>
+                                          <p:spTgt spid="5"/>
+                                        </p:tgtEl>
+                                        <p:attrNameLst>
+                                          <p:attrName>style.visibility</p:attrName>
+                                        </p:attrNameLst>
+                                      </p:cBhvr>
+                                      <p:to>
+                                        <p:strVal val="hidden"/>
+                                      </p:to>
+                                    </p:set>
+                                  </p:childTnLst>
+                                </p:cTn>
+                              </p:par>
+                            </p:childTnLst>
+                          </p:cTn>
+                        </p:par>
+                      </p:childTnLst>
+                    </p:cTn>
+                  </p:par>
+                </p:childTnLst>
+              </p:cTn>
+              <p:prevCondLst>
+                <p:cond evt="onPrev" delay="0">
+                  <p:tgtEl>
+                    <p:sldTgt/>
+                  </p:tgtEl>
+                </p:cond>
+              </p:prevCondLst>
+              <p:nextCondLst>
+                <p:cond evt="onNext" delay="0">
+                  <p:tgtEl>
+                    <p:sldTgt/>
+                  </p:tgtEl>
+                </p:cond>
+              </p:nextCondLst>
+            </p:seq>
+          </p:childTnLst>
+        </p:cTn>
       </p:par>
     </p:tnLst>
+    <p:bldLst>
+      <p:bldP spid="5" grpId="0" animBg="1"/>
+    </p:bldLst>
   </p:timing>
 </p:sld>
 </file>

</xml_diff>